<commit_message>
Completed pdp for 2018
On branch master
Your branch is up to date with 'origin/master'.

Changes to be committed:
      modified:   2018 PDP Jon Hatfield.pptx
</commit_message>
<xml_diff>
--- a/2018 PDP Jon Hatfield.pptx
+++ b/2018 PDP Jon Hatfield.pptx
@@ -208,7 +208,7 @@
           <a:p>
             <a:fld id="{0F8BB19D-712A-4A45-A0E6-D3B38EA759CD}" type="datetimeFigureOut">
               <a:rPr lang="en-US" smtClean="0"/>
-              <a:t>7/5/2018</a:t>
+              <a:t>7/13/2018</a:t>
             </a:fld>
             <a:endParaRPr lang="en-US"/>
           </a:p>
@@ -896,7 +896,7 @@
           <a:p>
             <a:fld id="{DC9A9F6A-340D-4355-9882-BA8A0DC29C51}" type="datetimeFigureOut">
               <a:rPr lang="en-US" smtClean="0"/>
-              <a:t>7/5/2018</a:t>
+              <a:t>7/13/2018</a:t>
             </a:fld>
             <a:endParaRPr lang="en-US"/>
           </a:p>
@@ -1064,7 +1064,7 @@
           <a:p>
             <a:fld id="{DC9A9F6A-340D-4355-9882-BA8A0DC29C51}" type="datetimeFigureOut">
               <a:rPr lang="en-US" smtClean="0"/>
-              <a:t>7/5/2018</a:t>
+              <a:t>7/13/2018</a:t>
             </a:fld>
             <a:endParaRPr lang="en-US"/>
           </a:p>
@@ -1242,7 +1242,7 @@
           <a:p>
             <a:fld id="{DC9A9F6A-340D-4355-9882-BA8A0DC29C51}" type="datetimeFigureOut">
               <a:rPr lang="en-US" smtClean="0"/>
-              <a:t>7/5/2018</a:t>
+              <a:t>7/13/2018</a:t>
             </a:fld>
             <a:endParaRPr lang="en-US"/>
           </a:p>
@@ -1410,7 +1410,7 @@
           <a:p>
             <a:fld id="{DC9A9F6A-340D-4355-9882-BA8A0DC29C51}" type="datetimeFigureOut">
               <a:rPr lang="en-US" smtClean="0"/>
-              <a:t>7/5/2018</a:t>
+              <a:t>7/13/2018</a:t>
             </a:fld>
             <a:endParaRPr lang="en-US"/>
           </a:p>
@@ -1655,7 +1655,7 @@
           <a:p>
             <a:fld id="{DC9A9F6A-340D-4355-9882-BA8A0DC29C51}" type="datetimeFigureOut">
               <a:rPr lang="en-US" smtClean="0"/>
-              <a:t>7/5/2018</a:t>
+              <a:t>7/13/2018</a:t>
             </a:fld>
             <a:endParaRPr lang="en-US"/>
           </a:p>
@@ -1940,7 +1940,7 @@
           <a:p>
             <a:fld id="{DC9A9F6A-340D-4355-9882-BA8A0DC29C51}" type="datetimeFigureOut">
               <a:rPr lang="en-US" smtClean="0"/>
-              <a:t>7/5/2018</a:t>
+              <a:t>7/13/2018</a:t>
             </a:fld>
             <a:endParaRPr lang="en-US"/>
           </a:p>
@@ -2359,7 +2359,7 @@
           <a:p>
             <a:fld id="{DC9A9F6A-340D-4355-9882-BA8A0DC29C51}" type="datetimeFigureOut">
               <a:rPr lang="en-US" smtClean="0"/>
-              <a:t>7/5/2018</a:t>
+              <a:t>7/13/2018</a:t>
             </a:fld>
             <a:endParaRPr lang="en-US"/>
           </a:p>
@@ -2476,7 +2476,7 @@
           <a:p>
             <a:fld id="{DC9A9F6A-340D-4355-9882-BA8A0DC29C51}" type="datetimeFigureOut">
               <a:rPr lang="en-US" smtClean="0"/>
-              <a:t>7/5/2018</a:t>
+              <a:t>7/13/2018</a:t>
             </a:fld>
             <a:endParaRPr lang="en-US"/>
           </a:p>
@@ -2571,7 +2571,7 @@
           <a:p>
             <a:fld id="{DC9A9F6A-340D-4355-9882-BA8A0DC29C51}" type="datetimeFigureOut">
               <a:rPr lang="en-US" smtClean="0"/>
-              <a:t>7/5/2018</a:t>
+              <a:t>7/13/2018</a:t>
             </a:fld>
             <a:endParaRPr lang="en-US"/>
           </a:p>
@@ -2846,7 +2846,7 @@
           <a:p>
             <a:fld id="{DC9A9F6A-340D-4355-9882-BA8A0DC29C51}" type="datetimeFigureOut">
               <a:rPr lang="en-US" smtClean="0"/>
-              <a:t>7/5/2018</a:t>
+              <a:t>7/13/2018</a:t>
             </a:fld>
             <a:endParaRPr lang="en-US"/>
           </a:p>
@@ -3098,7 +3098,7 @@
           <a:p>
             <a:fld id="{DC9A9F6A-340D-4355-9882-BA8A0DC29C51}" type="datetimeFigureOut">
               <a:rPr lang="en-US" smtClean="0"/>
-              <a:t>7/5/2018</a:t>
+              <a:t>7/13/2018</a:t>
             </a:fld>
             <a:endParaRPr lang="en-US"/>
           </a:p>
@@ -3309,7 +3309,7 @@
           <a:p>
             <a:fld id="{DC9A9F6A-340D-4355-9882-BA8A0DC29C51}" type="datetimeFigureOut">
               <a:rPr lang="en-US" smtClean="0"/>
-              <a:t>7/5/2018</a:t>
+              <a:t>7/13/2018</a:t>
             </a:fld>
             <a:endParaRPr lang="en-US"/>
           </a:p>
@@ -3693,7 +3693,7 @@
           <p:nvPr>
             <p:extLst>
               <p:ext uri="{D42A27DB-BD31-4B8C-83A1-F6EECF244321}">
-                <p14:modId xmlns:p14="http://schemas.microsoft.com/office/powerpoint/2010/main" val="1529044555"/>
+                <p14:modId xmlns:p14="http://schemas.microsoft.com/office/powerpoint/2010/main" val="3277056955"/>
               </p:ext>
             </p:extLst>
           </p:nvPr>
@@ -3770,37 +3770,6 @@
                     <a:bodyPr/>
                     <a:lstStyle/>
                     <a:p>
-                      <a:pPr marL="0" marR="0" lvl="0" indent="0" algn="ctr" defTabSz="914400" rtl="0" eaLnBrk="1" fontAlgn="base" latinLnBrk="0" hangingPunct="1">
-                        <a:lnSpc>
-                          <a:spcPct val="100000"/>
-                        </a:lnSpc>
-                        <a:spcBef>
-                          <a:spcPct val="20000"/>
-                        </a:spcBef>
-                        <a:spcAft>
-                          <a:spcPct val="0"/>
-                        </a:spcAft>
-                        <a:buClrTx/>
-                        <a:buSzTx/>
-                        <a:buFontTx/>
-                        <a:buNone/>
-                        <a:tabLst/>
-                      </a:pPr>
-                      <a:r>
-                        <a:rPr kumimoji="0" lang="en-US" sz="1600" b="0" i="0" u="none" strike="noStrike" cap="none" normalizeH="0" baseline="0" dirty="0">
-                          <a:ln>
-                            <a:noFill/>
-                          </a:ln>
-                          <a:solidFill>
-                            <a:schemeClr val="tx1"/>
-                          </a:solidFill>
-                          <a:effectLst/>
-                          <a:latin typeface="Times New Roman" pitchFamily="18" charset="0"/>
-                        </a:rPr>
-                        <a:t>Your photo here</a:t>
-                      </a:r>
-                    </a:p>
-                    <a:p>
                       <a:pPr marL="0" marR="0" lvl="0" indent="0" algn="l" defTabSz="914400" rtl="0" eaLnBrk="1" fontAlgn="base" latinLnBrk="0" hangingPunct="1">
                         <a:lnSpc>
                           <a:spcPct val="100000"/>
@@ -4618,31 +4587,8 @@
                           <a:effectLst/>
                           <a:latin typeface="Times New Roman" pitchFamily="18" charset="0"/>
                         </a:rPr>
-                        <a:t>Garish </a:t>
+                        <a:t>Garish Thumbadi</a:t>
                       </a:r>
-                      <a:r>
-                        <a:rPr kumimoji="0" lang="en-US" sz="1200" b="0" i="0" u="none" strike="noStrike" cap="none" normalizeH="0" baseline="0" dirty="0" err="1">
-                          <a:ln>
-                            <a:noFill/>
-                          </a:ln>
-                          <a:solidFill>
-                            <a:schemeClr val="tx1"/>
-                          </a:solidFill>
-                          <a:effectLst/>
-                          <a:latin typeface="Times New Roman" pitchFamily="18" charset="0"/>
-                        </a:rPr>
-                        <a:t>Thumbadi</a:t>
-                      </a:r>
-                      <a:endParaRPr kumimoji="0" lang="en-US" sz="1200" b="0" i="0" u="none" strike="noStrike" cap="none" normalizeH="0" baseline="0" dirty="0">
-                        <a:ln>
-                          <a:noFill/>
-                        </a:ln>
-                        <a:solidFill>
-                          <a:schemeClr val="tx1"/>
-                        </a:solidFill>
-                        <a:effectLst/>
-                        <a:latin typeface="Times New Roman" pitchFamily="18" charset="0"/>
-                      </a:endParaRPr>
                     </a:p>
                   </a:txBody>
                   <a:tcPr marT="0" marB="0" horzOverflow="overflow">
@@ -6356,19 +6302,6 @@
                         <a:defRPr/>
                       </a:pPr>
                       <a:r>
-                        <a:rPr kumimoji="0" lang="en-US" sz="1000" b="0" i="0" u="none" strike="noStrike" cap="none" normalizeH="0" baseline="0" dirty="0" err="1">
-                          <a:ln>
-                            <a:noFill/>
-                          </a:ln>
-                          <a:solidFill>
-                            <a:schemeClr val="tx1"/>
-                          </a:solidFill>
-                          <a:effectLst/>
-                          <a:latin typeface="Times New Roman" pitchFamily="18" charset="0"/>
-                        </a:rPr>
-                        <a:t>Stratice</a:t>
-                      </a:r>
-                      <a:r>
                         <a:rPr kumimoji="0" lang="en-US" sz="1000" b="0" i="0" u="none" strike="noStrike" cap="none" normalizeH="0" baseline="0" dirty="0">
                           <a:ln>
                             <a:noFill/>
@@ -6379,7 +6312,7 @@
                           <a:effectLst/>
                           <a:latin typeface="Times New Roman" pitchFamily="18" charset="0"/>
                         </a:rPr>
-                        <a:t> Healthcare, Inc.</a:t>
+                        <a:t>Stratice Healthcare, Inc.</a:t>
                       </a:r>
                     </a:p>
                   </a:txBody>
@@ -7494,19 +7427,6 @@
                         <a:tabLst/>
                       </a:pPr>
                       <a:r>
-                        <a:rPr kumimoji="0" lang="en-US" sz="1000" b="0" i="0" u="none" strike="noStrike" cap="none" normalizeH="0" baseline="0" dirty="0" err="1">
-                          <a:ln>
-                            <a:noFill/>
-                          </a:ln>
-                          <a:solidFill>
-                            <a:schemeClr val="tx1"/>
-                          </a:solidFill>
-                          <a:effectLst/>
-                          <a:latin typeface="Times New Roman" pitchFamily="18" charset="0"/>
-                        </a:rPr>
-                        <a:t>SearchSoft</a:t>
-                      </a:r>
-                      <a:r>
                         <a:rPr kumimoji="0" lang="en-US" sz="1000" b="0" i="0" u="none" strike="noStrike" cap="none" normalizeH="0" baseline="0" dirty="0">
                           <a:ln>
                             <a:noFill/>
@@ -7517,7 +7437,7 @@
                           <a:effectLst/>
                           <a:latin typeface="Times New Roman" pitchFamily="18" charset="0"/>
                         </a:rPr>
-                        <a:t> Solutions, Inc.</a:t>
+                        <a:t>SearchSoft Solutions, Inc.</a:t>
                       </a:r>
                     </a:p>
                   </a:txBody>
@@ -8558,7 +8478,7 @@
         <p:spPr bwMode="auto">
           <a:xfrm>
             <a:off x="5090762" y="457200"/>
-            <a:ext cx="3634138" cy="5763116"/>
+            <a:ext cx="3634138" cy="5439951"/>
           </a:xfrm>
           <a:prstGeom prst="rect">
             <a:avLst/>
@@ -8717,7 +8637,15 @@
             </a:pPr>
             <a:r>
               <a:rPr lang="en-US" altLang="en-US" sz="900" i="1" dirty="0"/>
-              <a:t>Become an expert at Oracle ATG and the POS system we’ve based off of it.  Learn anything I can to be more valuable and effective in my current role.</a:t>
+              <a:t>Become an expert at Oracle ATG and </a:t>
+            </a:r>
+            <a:r>
+              <a:rPr lang="en-US" altLang="en-US" sz="900" i="1" dirty="0" err="1"/>
+              <a:t>Filis</a:t>
+            </a:r>
+            <a:r>
+              <a:rPr lang="en-US" altLang="en-US" sz="900" i="1" dirty="0"/>
+              <a:t>.  Learn anything I can to be more valuable and effective in my current role.</a:t>
             </a:r>
           </a:p>
           <a:p>
@@ -8728,7 +8656,15 @@
             </a:pPr>
             <a:r>
               <a:rPr lang="en-US" altLang="en-US" sz="900" i="1" dirty="0"/>
-              <a:t>1-2 years:  Promotion to Senior Software Developer do to my demonstrated capability with Oracle ATG, the POS software we’ve based on it, and obvious wide-ranging knowledge of software development.  Upgrade our POS frontend to the current version of Angular.</a:t>
+              <a:t>1-2 years:  Promotion to Senior Software Developer do to my demonstrated capability with Oracle ATG, </a:t>
+            </a:r>
+            <a:r>
+              <a:rPr lang="en-US" altLang="en-US" sz="900" i="1" dirty="0" err="1"/>
+              <a:t>Filis</a:t>
+            </a:r>
+            <a:r>
+              <a:rPr lang="en-US" altLang="en-US" sz="900" i="1" dirty="0"/>
+              <a:t>, and obvious wide-ranging knowledge of software development.  Upgrade our POS frontend to the current version of Angular.</a:t>
             </a:r>
           </a:p>
           <a:p>
@@ -8922,7 +8858,7 @@
               <a:pPr algn="r">
                 <a:defRPr/>
               </a:pPr>
-              <a:t>7/5/2018</a:t>
+              <a:t>7/13/2018</a:t>
             </a:fld>
             <a:endParaRPr lang="en-US" dirty="0"/>
           </a:p>
@@ -8937,7 +8873,7 @@
           <p:nvPr>
             <p:extLst>
               <p:ext uri="{D42A27DB-BD31-4B8C-83A1-F6EECF244321}">
-                <p14:modId xmlns:p14="http://schemas.microsoft.com/office/powerpoint/2010/main" val="604403881"/>
+                <p14:modId xmlns:p14="http://schemas.microsoft.com/office/powerpoint/2010/main" val="2136429201"/>
               </p:ext>
             </p:extLst>
           </p:nvPr>
@@ -9066,7 +9002,7 @@
                     <a:p>
                       <a:r>
                         <a:rPr lang="en-US" sz="800" dirty="0"/>
-                        <a:t>None</a:t>
+                        <a:t>None?</a:t>
                       </a:r>
                     </a:p>
                   </a:txBody>
@@ -9187,6 +9123,42 @@
           </a:graphicData>
         </a:graphic>
       </p:graphicFrame>
+      <p:pic>
+        <p:nvPicPr>
+          <p:cNvPr id="5" name="Picture 4">
+            <a:extLst>
+              <a:ext uri="{FF2B5EF4-FFF2-40B4-BE49-F238E27FC236}">
+                <a16:creationId xmlns:a16="http://schemas.microsoft.com/office/drawing/2014/main" id="{8080E3AC-4C78-4F6F-8BF4-14E82CADEA2F}"/>
+              </a:ext>
+            </a:extLst>
+          </p:cNvPr>
+          <p:cNvPicPr>
+            <a:picLocks noChangeAspect="1"/>
+          </p:cNvPicPr>
+          <p:nvPr/>
+        </p:nvPicPr>
+        <p:blipFill>
+          <a:blip r:embed="rId3" cstate="print">
+            <a:extLst>
+              <a:ext uri="{28A0092B-C50C-407E-A947-70E740481C1C}">
+                <a14:useLocalDpi xmlns:a14="http://schemas.microsoft.com/office/drawing/2010/main" val="0"/>
+              </a:ext>
+            </a:extLst>
+          </a:blip>
+          <a:stretch>
+            <a:fillRect/>
+          </a:stretch>
+        </p:blipFill>
+        <p:spPr>
+          <a:xfrm>
+            <a:off x="160260" y="457201"/>
+            <a:ext cx="1385277" cy="1904999"/>
+          </a:xfrm>
+          <a:prstGeom prst="rect">
+            <a:avLst/>
+          </a:prstGeom>
+        </p:spPr>
+      </p:pic>
     </p:spTree>
     <p:extLst>
       <p:ext uri="{BB962C8B-B14F-4D97-AF65-F5344CB8AC3E}">

</xml_diff>

<commit_message>
Updated PDP - January 2019
On branch master
Your branch is up to date with 'origin/master'.

Changes to be committed:
      modified:   2018 PDP Jon Hatfield.pptx
</commit_message>
<xml_diff>
--- a/2018 PDP Jon Hatfield.pptx
+++ b/2018 PDP Jon Hatfield.pptx
@@ -208,7 +208,7 @@
           <a:p>
             <a:fld id="{0F8BB19D-712A-4A45-A0E6-D3B38EA759CD}" type="datetimeFigureOut">
               <a:rPr lang="en-US" smtClean="0"/>
-              <a:t>7/13/2018</a:t>
+              <a:t>1/3/2019</a:t>
             </a:fld>
             <a:endParaRPr lang="en-US"/>
           </a:p>
@@ -896,7 +896,7 @@
           <a:p>
             <a:fld id="{DC9A9F6A-340D-4355-9882-BA8A0DC29C51}" type="datetimeFigureOut">
               <a:rPr lang="en-US" smtClean="0"/>
-              <a:t>7/13/2018</a:t>
+              <a:t>1/3/2019</a:t>
             </a:fld>
             <a:endParaRPr lang="en-US"/>
           </a:p>
@@ -1064,7 +1064,7 @@
           <a:p>
             <a:fld id="{DC9A9F6A-340D-4355-9882-BA8A0DC29C51}" type="datetimeFigureOut">
               <a:rPr lang="en-US" smtClean="0"/>
-              <a:t>7/13/2018</a:t>
+              <a:t>1/3/2019</a:t>
             </a:fld>
             <a:endParaRPr lang="en-US"/>
           </a:p>
@@ -1242,7 +1242,7 @@
           <a:p>
             <a:fld id="{DC9A9F6A-340D-4355-9882-BA8A0DC29C51}" type="datetimeFigureOut">
               <a:rPr lang="en-US" smtClean="0"/>
-              <a:t>7/13/2018</a:t>
+              <a:t>1/3/2019</a:t>
             </a:fld>
             <a:endParaRPr lang="en-US"/>
           </a:p>
@@ -1410,7 +1410,7 @@
           <a:p>
             <a:fld id="{DC9A9F6A-340D-4355-9882-BA8A0DC29C51}" type="datetimeFigureOut">
               <a:rPr lang="en-US" smtClean="0"/>
-              <a:t>7/13/2018</a:t>
+              <a:t>1/3/2019</a:t>
             </a:fld>
             <a:endParaRPr lang="en-US"/>
           </a:p>
@@ -1655,7 +1655,7 @@
           <a:p>
             <a:fld id="{DC9A9F6A-340D-4355-9882-BA8A0DC29C51}" type="datetimeFigureOut">
               <a:rPr lang="en-US" smtClean="0"/>
-              <a:t>7/13/2018</a:t>
+              <a:t>1/3/2019</a:t>
             </a:fld>
             <a:endParaRPr lang="en-US"/>
           </a:p>
@@ -1940,7 +1940,7 @@
           <a:p>
             <a:fld id="{DC9A9F6A-340D-4355-9882-BA8A0DC29C51}" type="datetimeFigureOut">
               <a:rPr lang="en-US" smtClean="0"/>
-              <a:t>7/13/2018</a:t>
+              <a:t>1/3/2019</a:t>
             </a:fld>
             <a:endParaRPr lang="en-US"/>
           </a:p>
@@ -2359,7 +2359,7 @@
           <a:p>
             <a:fld id="{DC9A9F6A-340D-4355-9882-BA8A0DC29C51}" type="datetimeFigureOut">
               <a:rPr lang="en-US" smtClean="0"/>
-              <a:t>7/13/2018</a:t>
+              <a:t>1/3/2019</a:t>
             </a:fld>
             <a:endParaRPr lang="en-US"/>
           </a:p>
@@ -2476,7 +2476,7 @@
           <a:p>
             <a:fld id="{DC9A9F6A-340D-4355-9882-BA8A0DC29C51}" type="datetimeFigureOut">
               <a:rPr lang="en-US" smtClean="0"/>
-              <a:t>7/13/2018</a:t>
+              <a:t>1/3/2019</a:t>
             </a:fld>
             <a:endParaRPr lang="en-US"/>
           </a:p>
@@ -2571,7 +2571,7 @@
           <a:p>
             <a:fld id="{DC9A9F6A-340D-4355-9882-BA8A0DC29C51}" type="datetimeFigureOut">
               <a:rPr lang="en-US" smtClean="0"/>
-              <a:t>7/13/2018</a:t>
+              <a:t>1/3/2019</a:t>
             </a:fld>
             <a:endParaRPr lang="en-US"/>
           </a:p>
@@ -2846,7 +2846,7 @@
           <a:p>
             <a:fld id="{DC9A9F6A-340D-4355-9882-BA8A0DC29C51}" type="datetimeFigureOut">
               <a:rPr lang="en-US" smtClean="0"/>
-              <a:t>7/13/2018</a:t>
+              <a:t>1/3/2019</a:t>
             </a:fld>
             <a:endParaRPr lang="en-US"/>
           </a:p>
@@ -3098,7 +3098,7 @@
           <a:p>
             <a:fld id="{DC9A9F6A-340D-4355-9882-BA8A0DC29C51}" type="datetimeFigureOut">
               <a:rPr lang="en-US" smtClean="0"/>
-              <a:t>7/13/2018</a:t>
+              <a:t>1/3/2019</a:t>
             </a:fld>
             <a:endParaRPr lang="en-US"/>
           </a:p>
@@ -3309,7 +3309,7 @@
           <a:p>
             <a:fld id="{DC9A9F6A-340D-4355-9882-BA8A0DC29C51}" type="datetimeFigureOut">
               <a:rPr lang="en-US" smtClean="0"/>
-              <a:t>7/13/2018</a:t>
+              <a:t>1/3/2019</a:t>
             </a:fld>
             <a:endParaRPr lang="en-US"/>
           </a:p>
@@ -3693,14 +3693,14 @@
           <p:nvPr>
             <p:extLst>
               <p:ext uri="{D42A27DB-BD31-4B8C-83A1-F6EECF244321}">
-                <p14:modId xmlns:p14="http://schemas.microsoft.com/office/powerpoint/2010/main" val="3277056955"/>
+                <p14:modId xmlns:p14="http://schemas.microsoft.com/office/powerpoint/2010/main" val="443394809"/>
               </p:ext>
             </p:extLst>
           </p:nvPr>
         </p:nvGraphicFramePr>
         <p:xfrm>
           <a:off x="160260" y="457200"/>
-          <a:ext cx="4886325" cy="5852964"/>
+          <a:ext cx="4886325" cy="6054474"/>
         </p:xfrm>
         <a:graphic>
           <a:graphicData uri="http://schemas.openxmlformats.org/drawingml/2006/table">
@@ -4178,27 +4178,20 @@
                         <a:defRPr/>
                       </a:pPr>
                       <a:r>
-                        <a:rPr lang="en-US" sz="1200" i="0" kern="1200" dirty="0">
+                        <a:rPr kumimoji="0" lang="en-US" sz="1200" b="0" i="0" u="none" strike="noStrike" kern="1200" cap="none" normalizeH="0" baseline="0" dirty="0">
+                          <a:ln>
+                            <a:noFill/>
+                          </a:ln>
                           <a:solidFill>
                             <a:schemeClr val="tx1"/>
                           </a:solidFill>
                           <a:effectLst/>
-                          <a:latin typeface="+mn-lt"/>
+                          <a:latin typeface="Times New Roman" pitchFamily="18" charset="0"/>
                           <a:ea typeface="+mn-ea"/>
                           <a:cs typeface="+mn-cs"/>
                         </a:rPr>
                         <a:t>Software Developer</a:t>
                       </a:r>
-                      <a:endParaRPr kumimoji="0" lang="en-US" sz="1200" b="0" i="0" u="none" strike="noStrike" cap="none" normalizeH="0" baseline="0" dirty="0">
-                        <a:ln>
-                          <a:noFill/>
-                        </a:ln>
-                        <a:solidFill>
-                          <a:schemeClr val="tx1"/>
-                        </a:solidFill>
-                        <a:effectLst/>
-                        <a:latin typeface="Times New Roman" pitchFamily="18" charset="0"/>
-                      </a:endParaRPr>
                     </a:p>
                   </a:txBody>
                   <a:tcPr marT="0" marB="0" horzOverflow="overflow">
@@ -4587,7 +4580,7 @@
                           <a:effectLst/>
                           <a:latin typeface="Times New Roman" pitchFamily="18" charset="0"/>
                         </a:rPr>
-                        <a:t>Garish Thumbadi</a:t>
+                        <a:t>Dennis Middleton</a:t>
                       </a:r>
                     </a:p>
                   </a:txBody>
@@ -8198,7 +8191,7 @@
                           <a:effectLst/>
                           <a:latin typeface="Times New Roman" pitchFamily="18" charset="0"/>
                         </a:rPr>
-                        <a:t>My family, Technical Reading, Audiobooks, Minecraft, Politics, Cooking Outdoors</a:t>
+                        <a:t>My family, Technical Reading, Audiobooks, Minecraft, Politics, Cooking Outdoors, Physics, Higher Mathematics</a:t>
                       </a:r>
                     </a:p>
                   </a:txBody>
@@ -8478,7 +8471,7 @@
         <p:spPr bwMode="auto">
           <a:xfrm>
             <a:off x="5090762" y="457200"/>
-            <a:ext cx="3634138" cy="5439951"/>
+            <a:ext cx="3634138" cy="5855449"/>
           </a:xfrm>
           <a:prstGeom prst="rect">
             <a:avLst/>
@@ -8637,7 +8630,26 @@
             </a:pPr>
             <a:r>
               <a:rPr lang="en-US" altLang="en-US" sz="900" i="1" dirty="0"/>
-              <a:t>Become an expert at Oracle ATG and </a:t>
+              <a:t>Help the team become more effective at our tasks by sharing knowledge, promoting learning opportunities, and implementing best practices.  Improve the codebase by refactoring and increased test coverage.  Learn anything I can to be more valuable and effective in my current role. </a:t>
+            </a:r>
+          </a:p>
+          <a:p>
+            <a:pPr eaLnBrk="1" hangingPunct="1">
+              <a:spcBef>
+                <a:spcPct val="50000"/>
+              </a:spcBef>
+            </a:pPr>
+            <a:r>
+              <a:rPr lang="en-US" altLang="en-US" sz="900" i="1" dirty="0"/>
+              <a:t>1-2 years:  Promotion to Senior Software Developer </a:t>
+            </a:r>
+            <a:r>
+              <a:rPr lang="en-US" altLang="en-US" sz="900" i="1"/>
+              <a:t>at TCC do </a:t>
+            </a:r>
+            <a:r>
+              <a:rPr lang="en-US" altLang="en-US" sz="900" i="1" dirty="0"/>
+              <a:t>to my demonstrated effectiveness developing in </a:t>
             </a:r>
             <a:r>
               <a:rPr lang="en-US" altLang="en-US" sz="900" i="1" dirty="0" err="1"/>
@@ -8645,26 +8657,7 @@
             </a:r>
             <a:r>
               <a:rPr lang="en-US" altLang="en-US" sz="900" i="1" dirty="0"/>
-              <a:t>.  Learn anything I can to be more valuable and effective in my current role.</a:t>
-            </a:r>
-          </a:p>
-          <a:p>
-            <a:pPr eaLnBrk="1" hangingPunct="1">
-              <a:spcBef>
-                <a:spcPct val="50000"/>
-              </a:spcBef>
-            </a:pPr>
-            <a:r>
-              <a:rPr lang="en-US" altLang="en-US" sz="900" i="1" dirty="0"/>
-              <a:t>1-2 years:  Promotion to Senior Software Developer do to my demonstrated capability with Oracle ATG, </a:t>
-            </a:r>
-            <a:r>
-              <a:rPr lang="en-US" altLang="en-US" sz="900" i="1" dirty="0" err="1"/>
-              <a:t>Filis</a:t>
-            </a:r>
-            <a:r>
-              <a:rPr lang="en-US" altLang="en-US" sz="900" i="1" dirty="0"/>
-              <a:t>, and obvious wide-ranging knowledge of software development.  Upgrade our POS frontend to the current version of Angular.</a:t>
+              <a:t> and obvious wide-ranging knowledge of software development.  Upgrade our POS frontend to the current version of Angular.</a:t>
             </a:r>
           </a:p>
           <a:p>
@@ -8690,7 +8683,7 @@
             </a:r>
             <a:r>
               <a:rPr lang="en-US" altLang="en-US" sz="900" i="1" dirty="0"/>
-              <a:t>Senior Software Developer or higher position at TCC, possibly a leadership role, but one where I spent my time writing software and not in meetings all day.</a:t>
+              <a:t>Senior Software Developer or higher position at TCC, possibly a leadership role, as long as I still spend most of my time writing software and helping others to do so.</a:t>
             </a:r>
           </a:p>
           <a:p>
@@ -8754,7 +8747,7 @@
             </a:r>
             <a:r>
               <a:rPr lang="en-US" altLang="en-US" sz="900" i="1" dirty="0"/>
-              <a:t>Small talk and interpersonal relations, Talking to non-developers</a:t>
+              <a:t>Small talk and interpersonal relations, Talking to non-developers, More experience with front end development</a:t>
             </a:r>
           </a:p>
           <a:p>
@@ -8858,7 +8851,7 @@
               <a:pPr algn="r">
                 <a:defRPr/>
               </a:pPr>
-              <a:t>7/13/2018</a:t>
+              <a:t>1/3/2019</a:t>
             </a:fld>
             <a:endParaRPr lang="en-US" dirty="0"/>
           </a:p>
@@ -8873,7 +8866,7 @@
           <p:nvPr>
             <p:extLst>
               <p:ext uri="{D42A27DB-BD31-4B8C-83A1-F6EECF244321}">
-                <p14:modId xmlns:p14="http://schemas.microsoft.com/office/powerpoint/2010/main" val="2136429201"/>
+                <p14:modId xmlns:p14="http://schemas.microsoft.com/office/powerpoint/2010/main" val="1439876244"/>
               </p:ext>
             </p:extLst>
           </p:nvPr>
@@ -9002,7 +8995,7 @@
                     <a:p>
                       <a:r>
                         <a:rPr lang="en-US" sz="800" dirty="0"/>
-                        <a:t>None?</a:t>
+                        <a:t>Yes</a:t>
                       </a:r>
                     </a:p>
                   </a:txBody>
@@ -9035,7 +9028,7 @@
                     <a:p>
                       <a:r>
                         <a:rPr lang="en-US" sz="800" dirty="0"/>
-                        <a:t>Learn Angular 5-6</a:t>
+                        <a:t>More experience with AngularJS</a:t>
                       </a:r>
                     </a:p>
                   </a:txBody>
@@ -9107,7 +9100,7 @@
                     <a:p>
                       <a:r>
                         <a:rPr lang="en-US" sz="800" dirty="0"/>
-                        <a:t>Not started yet</a:t>
+                        <a:t>In progress</a:t>
                       </a:r>
                     </a:p>
                   </a:txBody>
@@ -9743,6 +9736,21 @@
 </file>
 
 <file path=customXml/item1.xml><?xml version="1.0" encoding="utf-8"?>
+<p:properties xmlns:p="http://schemas.microsoft.com/office/2006/metadata/properties" xmlns:xsi="http://www.w3.org/2001/XMLSchema-instance" xmlns:pc="http://schemas.microsoft.com/office/infopath/2007/PartnerControls">
+  <documentManagement/>
+</p:properties>
+</file>
+
+<file path=customXml/item2.xml><?xml version="1.0" encoding="utf-8"?>
+<?mso-contentType ?>
+<FormTemplates xmlns="http://schemas.microsoft.com/sharepoint/v3/contenttype/forms">
+  <Display>DocumentLibraryForm</Display>
+  <Edit>DocumentLibraryForm</Edit>
+  <New>DocumentLibraryForm</New>
+</FormTemplates>
+</file>
+
+<file path=customXml/item3.xml><?xml version="1.0" encoding="utf-8"?>
 <ct:contentTypeSchema xmlns:ct="http://schemas.microsoft.com/office/2006/metadata/contentType" xmlns:ma="http://schemas.microsoft.com/office/2006/metadata/properties/metaAttributes" ct:_="" ma:_="" ma:contentTypeName="Document" ma:contentTypeID="0x010100441FC44AF9165046991ED0A09A2EE382" ma:contentTypeVersion="4" ma:contentTypeDescription="Create a new document." ma:contentTypeScope="" ma:versionID="3c19480ee1272a1646b1291bee9c506e">
   <xsd:schema xmlns:xsd="http://www.w3.org/2001/XMLSchema" xmlns:xs="http://www.w3.org/2001/XMLSchema" xmlns:p="http://schemas.microsoft.com/office/2006/metadata/properties" xmlns:ns2="6673900f-b0a1-4f79-bd55-2517aad1163a" xmlns:ns3="ce98d72f-45c0-4d0f-8af3-8bee4a4b638b" targetNamespace="http://schemas.microsoft.com/office/2006/metadata/properties" ma:root="true" ma:fieldsID="68f34b566f8394f8c12cc26b34c16e09" ns2:_="" ns3:_="">
     <xsd:import namespace="6673900f-b0a1-4f79-bd55-2517aad1163a"/>
@@ -9907,22 +9915,32 @@
 </ct:contentTypeSchema>
 </file>
 
-<file path=customXml/item2.xml><?xml version="1.0" encoding="utf-8"?>
-<?mso-contentType ?>
-<FormTemplates xmlns="http://schemas.microsoft.com/sharepoint/v3/contenttype/forms">
-  <Display>DocumentLibraryForm</Display>
-  <Edit>DocumentLibraryForm</Edit>
-  <New>DocumentLibraryForm</New>
-</FormTemplates>
+<file path=customXml/itemProps1.xml><?xml version="1.0" encoding="utf-8"?>
+<ds:datastoreItem xmlns:ds="http://schemas.openxmlformats.org/officeDocument/2006/customXml" ds:itemID="{5B3D5F8C-7570-43C6-93C6-44943945D304}">
+  <ds:schemaRefs>
+    <ds:schemaRef ds:uri="http://schemas.openxmlformats.org/package/2006/metadata/core-properties"/>
+    <ds:schemaRef ds:uri="http://purl.org/dc/terms/"/>
+    <ds:schemaRef ds:uri="http://schemas.microsoft.com/office/infopath/2007/PartnerControls"/>
+    <ds:schemaRef ds:uri="http://schemas.microsoft.com/office/2006/documentManagement/types"/>
+    <ds:schemaRef ds:uri="6673900f-b0a1-4f79-bd55-2517aad1163a"/>
+    <ds:schemaRef ds:uri="http://purl.org/dc/elements/1.1/"/>
+    <ds:schemaRef ds:uri="http://schemas.microsoft.com/office/2006/metadata/properties"/>
+    <ds:schemaRef ds:uri="ce98d72f-45c0-4d0f-8af3-8bee4a4b638b"/>
+    <ds:schemaRef ds:uri="http://www.w3.org/XML/1998/namespace"/>
+    <ds:schemaRef ds:uri="http://purl.org/dc/dcmitype/"/>
+  </ds:schemaRefs>
+</ds:datastoreItem>
 </file>
 
-<file path=customXml/item3.xml><?xml version="1.0" encoding="utf-8"?>
-<p:properties xmlns:p="http://schemas.microsoft.com/office/2006/metadata/properties" xmlns:xsi="http://www.w3.org/2001/XMLSchema-instance" xmlns:pc="http://schemas.microsoft.com/office/infopath/2007/PartnerControls">
-  <documentManagement/>
-</p:properties>
+<file path=customXml/itemProps2.xml><?xml version="1.0" encoding="utf-8"?>
+<ds:datastoreItem xmlns:ds="http://schemas.openxmlformats.org/officeDocument/2006/customXml" ds:itemID="{11306B39-34E4-421A-8FF5-664AB54D8CA5}">
+  <ds:schemaRefs>
+    <ds:schemaRef ds:uri="http://schemas.microsoft.com/sharepoint/v3/contenttype/forms"/>
+  </ds:schemaRefs>
+</ds:datastoreItem>
 </file>
 
-<file path=customXml/itemProps1.xml><?xml version="1.0" encoding="utf-8"?>
+<file path=customXml/itemProps3.xml><?xml version="1.0" encoding="utf-8"?>
 <ds:datastoreItem xmlns:ds="http://schemas.openxmlformats.org/officeDocument/2006/customXml" ds:itemID="{3E149BB7-0730-4C2C-8653-5D94F7F22DA0}">
   <ds:schemaRefs>
     <ds:schemaRef ds:uri="http://schemas.microsoft.com/office/2006/metadata/contentType"/>
@@ -9939,29 +9957,4 @@
     <ds:schemaRef ds:uri="http://schemas.microsoft.com/internal/obd"/>
   </ds:schemaRefs>
 </ds:datastoreItem>
-</file>
-
-<file path=customXml/itemProps2.xml><?xml version="1.0" encoding="utf-8"?>
-<ds:datastoreItem xmlns:ds="http://schemas.openxmlformats.org/officeDocument/2006/customXml" ds:itemID="{11306B39-34E4-421A-8FF5-664AB54D8CA5}">
-  <ds:schemaRefs>
-    <ds:schemaRef ds:uri="http://schemas.microsoft.com/sharepoint/v3/contenttype/forms"/>
-  </ds:schemaRefs>
-</ds:datastoreItem>
-</file>
-
-<file path=customXml/itemProps3.xml><?xml version="1.0" encoding="utf-8"?>
-<ds:datastoreItem xmlns:ds="http://schemas.openxmlformats.org/officeDocument/2006/customXml" ds:itemID="{5B3D5F8C-7570-43C6-93C6-44943945D304}">
-  <ds:schemaRefs>
-    <ds:schemaRef ds:uri="http://schemas.openxmlformats.org/package/2006/metadata/core-properties"/>
-    <ds:schemaRef ds:uri="http://purl.org/dc/terms/"/>
-    <ds:schemaRef ds:uri="http://schemas.microsoft.com/office/infopath/2007/PartnerControls"/>
-    <ds:schemaRef ds:uri="http://schemas.microsoft.com/office/2006/documentManagement/types"/>
-    <ds:schemaRef ds:uri="6673900f-b0a1-4f79-bd55-2517aad1163a"/>
-    <ds:schemaRef ds:uri="http://purl.org/dc/elements/1.1/"/>
-    <ds:schemaRef ds:uri="http://schemas.microsoft.com/office/2006/metadata/properties"/>
-    <ds:schemaRef ds:uri="ce98d72f-45c0-4d0f-8af3-8bee4a4b638b"/>
-    <ds:schemaRef ds:uri="http://www.w3.org/XML/1998/namespace"/>
-    <ds:schemaRef ds:uri="http://purl.org/dc/dcmitype/"/>
-  </ds:schemaRefs>
-</ds:datastoreItem>
 </file>
</xml_diff>